<commit_message>
made tweaks on markdown
</commit_message>
<xml_diff>
--- a/presentation.pdf.pptx
+++ b/presentation.pdf.pptx
@@ -115,6 +115,11 @@
       </a:defRPr>
     </a:lvl9pPr>
   </p:defaultTextStyle>
+  <p:extLst>
+    <p:ext uri="{EFAFB233-063F-42B5-8137-9DF3F51BA10A}">
+      <p15:sldGuideLst xmlns:p15="http://schemas.microsoft.com/office/powerpoint/2012/main"/>
+    </p:ext>
+  </p:extLst>
 </p:presentation>
 </file>
 
@@ -168,7 +173,7 @@
           <a:noFill/>
           <a:extLst>
             <a:ext uri="{909E8E84-426E-40dd-AFC4-6F175D3DCCD1}">
-              <a14:hiddenFill xmlns:a14="http://schemas.microsoft.com/office/drawing/2010/main" xmlns="">
+              <a14:hiddenFill xmlns="" xmlns:a14="http://schemas.microsoft.com/office/drawing/2010/main">
                 <a:solidFill>
                   <a:srgbClr val="FFFFFF"/>
                 </a:solidFill>
@@ -228,7 +233,7 @@
             </a:ln>
             <a:extLst>
               <a:ext uri="{91240B29-F687-4f45-9708-019B960494DF}">
-                <a14:hiddenLine xmlns:a14="http://schemas.microsoft.com/office/drawing/2010/main" xmlns="" w="9525">
+                <a14:hiddenLine xmlns="" xmlns:a14="http://schemas.microsoft.com/office/drawing/2010/main" w="9525">
                   <a:solidFill>
                     <a:srgbClr val="000000"/>
                   </a:solidFill>
@@ -318,7 +323,7 @@
             </a:ln>
             <a:extLst>
               <a:ext uri="{91240B29-F687-4f45-9708-019B960494DF}">
-                <a14:hiddenLine xmlns:a14="http://schemas.microsoft.com/office/drawing/2010/main" xmlns="" w="9525">
+                <a14:hiddenLine xmlns="" xmlns:a14="http://schemas.microsoft.com/office/drawing/2010/main" w="9525">
                   <a:solidFill>
                     <a:srgbClr val="000000"/>
                   </a:solidFill>
@@ -408,7 +413,7 @@
             </a:ln>
             <a:extLst>
               <a:ext uri="{91240B29-F687-4f45-9708-019B960494DF}">
-                <a14:hiddenLine xmlns:a14="http://schemas.microsoft.com/office/drawing/2010/main" xmlns="" w="9525">
+                <a14:hiddenLine xmlns="" xmlns:a14="http://schemas.microsoft.com/office/drawing/2010/main" w="9525">
                   <a:solidFill>
                     <a:srgbClr val="000000"/>
                   </a:solidFill>
@@ -442,7 +447,7 @@
             </a:ln>
             <a:extLst>
               <a:ext uri="{91240B29-F687-4f45-9708-019B960494DF}">
-                <a14:hiddenLine xmlns:a14="http://schemas.microsoft.com/office/drawing/2010/main" xmlns="" w="9525">
+                <a14:hiddenLine xmlns="" xmlns:a14="http://schemas.microsoft.com/office/drawing/2010/main" w="9525">
                   <a:solidFill>
                     <a:srgbClr val="000000"/>
                   </a:solidFill>
@@ -532,7 +537,7 @@
             </a:ln>
             <a:extLst>
               <a:ext uri="{91240B29-F687-4f45-9708-019B960494DF}">
-                <a14:hiddenLine xmlns:a14="http://schemas.microsoft.com/office/drawing/2010/main" xmlns="" w="9525">
+                <a14:hiddenLine xmlns="" xmlns:a14="http://schemas.microsoft.com/office/drawing/2010/main" w="9525">
                   <a:solidFill>
                     <a:srgbClr val="000000"/>
                   </a:solidFill>
@@ -594,7 +599,7 @@
             </a:ln>
             <a:extLst>
               <a:ext uri="{91240B29-F687-4f45-9708-019B960494DF}">
-                <a14:hiddenLine xmlns:a14="http://schemas.microsoft.com/office/drawing/2010/main" xmlns="" w="9525">
+                <a14:hiddenLine xmlns="" xmlns:a14="http://schemas.microsoft.com/office/drawing/2010/main" w="9525">
                   <a:solidFill>
                     <a:srgbClr val="000000"/>
                   </a:solidFill>
@@ -656,7 +661,7 @@
             </a:ln>
             <a:extLst>
               <a:ext uri="{91240B29-F687-4f45-9708-019B960494DF}">
-                <a14:hiddenLine xmlns:a14="http://schemas.microsoft.com/office/drawing/2010/main" xmlns="" w="9525">
+                <a14:hiddenLine xmlns="" xmlns:a14="http://schemas.microsoft.com/office/drawing/2010/main" w="9525">
                   <a:solidFill>
                     <a:srgbClr val="000000"/>
                   </a:solidFill>
@@ -746,7 +751,7 @@
             </a:ln>
             <a:extLst>
               <a:ext uri="{91240B29-F687-4f45-9708-019B960494DF}">
-                <a14:hiddenLine xmlns:a14="http://schemas.microsoft.com/office/drawing/2010/main" xmlns="" w="9525">
+                <a14:hiddenLine xmlns="" xmlns:a14="http://schemas.microsoft.com/office/drawing/2010/main" w="9525">
                   <a:solidFill>
                     <a:srgbClr val="000000"/>
                   </a:solidFill>
@@ -808,7 +813,7 @@
             </a:ln>
             <a:extLst>
               <a:ext uri="{91240B29-F687-4f45-9708-019B960494DF}">
-                <a14:hiddenLine xmlns:a14="http://schemas.microsoft.com/office/drawing/2010/main" xmlns="" w="9525">
+                <a14:hiddenLine xmlns="" xmlns:a14="http://schemas.microsoft.com/office/drawing/2010/main" w="9525">
                   <a:solidFill>
                     <a:srgbClr val="000000"/>
                   </a:solidFill>
@@ -870,7 +875,7 @@
             </a:ln>
             <a:extLst>
               <a:ext uri="{91240B29-F687-4f45-9708-019B960494DF}">
-                <a14:hiddenLine xmlns:a14="http://schemas.microsoft.com/office/drawing/2010/main" xmlns="" w="9525">
+                <a14:hiddenLine xmlns="" xmlns:a14="http://schemas.microsoft.com/office/drawing/2010/main" w="9525">
                   <a:solidFill>
                     <a:srgbClr val="000000"/>
                   </a:solidFill>
@@ -960,7 +965,7 @@
             </a:ln>
             <a:extLst>
               <a:ext uri="{91240B29-F687-4f45-9708-019B960494DF}">
-                <a14:hiddenLine xmlns:a14="http://schemas.microsoft.com/office/drawing/2010/main" xmlns="" w="9525">
+                <a14:hiddenLine xmlns="" xmlns:a14="http://schemas.microsoft.com/office/drawing/2010/main" w="9525">
                   <a:solidFill>
                     <a:srgbClr val="000000"/>
                   </a:solidFill>
@@ -1050,7 +1055,7 @@
             </a:ln>
             <a:extLst>
               <a:ext uri="{91240B29-F687-4f45-9708-019B960494DF}">
-                <a14:hiddenLine xmlns:a14="http://schemas.microsoft.com/office/drawing/2010/main" xmlns="" w="9525">
+                <a14:hiddenLine xmlns="" xmlns:a14="http://schemas.microsoft.com/office/drawing/2010/main" w="9525">
                   <a:solidFill>
                     <a:srgbClr val="000000"/>
                   </a:solidFill>
@@ -1112,7 +1117,7 @@
             </a:ln>
             <a:extLst>
               <a:ext uri="{91240B29-F687-4f45-9708-019B960494DF}">
-                <a14:hiddenLine xmlns:a14="http://schemas.microsoft.com/office/drawing/2010/main" xmlns="" w="9525">
+                <a14:hiddenLine xmlns="" xmlns:a14="http://schemas.microsoft.com/office/drawing/2010/main" w="9525">
                   <a:solidFill>
                     <a:srgbClr val="000000"/>
                   </a:solidFill>
@@ -1222,7 +1227,7 @@
             </a:ln>
             <a:extLst>
               <a:ext uri="{91240B29-F687-4f45-9708-019B960494DF}">
-                <a14:hiddenLine xmlns:a14="http://schemas.microsoft.com/office/drawing/2010/main" xmlns="" w="9525">
+                <a14:hiddenLine xmlns="" xmlns:a14="http://schemas.microsoft.com/office/drawing/2010/main" w="9525">
                   <a:solidFill>
                     <a:srgbClr val="000000"/>
                   </a:solidFill>
@@ -1284,7 +1289,7 @@
             </a:ln>
             <a:extLst>
               <a:ext uri="{91240B29-F687-4f45-9708-019B960494DF}">
-                <a14:hiddenLine xmlns:a14="http://schemas.microsoft.com/office/drawing/2010/main" xmlns="" w="9525">
+                <a14:hiddenLine xmlns="" xmlns:a14="http://schemas.microsoft.com/office/drawing/2010/main" w="9525">
                   <a:solidFill>
                     <a:srgbClr val="000000"/>
                   </a:solidFill>
@@ -1374,7 +1379,7 @@
             </a:ln>
             <a:extLst>
               <a:ext uri="{91240B29-F687-4f45-9708-019B960494DF}">
-                <a14:hiddenLine xmlns:a14="http://schemas.microsoft.com/office/drawing/2010/main" xmlns="" w="9525">
+                <a14:hiddenLine xmlns="" xmlns:a14="http://schemas.microsoft.com/office/drawing/2010/main" w="9525">
                   <a:solidFill>
                     <a:srgbClr val="000000"/>
                   </a:solidFill>
@@ -1464,7 +1469,7 @@
             </a:ln>
             <a:extLst>
               <a:ext uri="{91240B29-F687-4f45-9708-019B960494DF}">
-                <a14:hiddenLine xmlns:a14="http://schemas.microsoft.com/office/drawing/2010/main" xmlns="" w="9525">
+                <a14:hiddenLine xmlns="" xmlns:a14="http://schemas.microsoft.com/office/drawing/2010/main" w="9525">
                   <a:solidFill>
                     <a:srgbClr val="000000"/>
                   </a:solidFill>
@@ -1526,7 +1531,7 @@
             </a:ln>
             <a:extLst>
               <a:ext uri="{91240B29-F687-4f45-9708-019B960494DF}">
-                <a14:hiddenLine xmlns:a14="http://schemas.microsoft.com/office/drawing/2010/main" xmlns="" w="9525">
+                <a14:hiddenLine xmlns="" xmlns:a14="http://schemas.microsoft.com/office/drawing/2010/main" w="9525">
                   <a:solidFill>
                     <a:srgbClr val="000000"/>
                   </a:solidFill>
@@ -1616,7 +1621,7 @@
             </a:ln>
             <a:extLst>
               <a:ext uri="{91240B29-F687-4f45-9708-019B960494DF}">
-                <a14:hiddenLine xmlns:a14="http://schemas.microsoft.com/office/drawing/2010/main" xmlns="" w="9525">
+                <a14:hiddenLine xmlns="" xmlns:a14="http://schemas.microsoft.com/office/drawing/2010/main" w="9525">
                   <a:solidFill>
                     <a:srgbClr val="000000"/>
                   </a:solidFill>
@@ -1706,7 +1711,7 @@
             </a:ln>
             <a:extLst>
               <a:ext uri="{91240B29-F687-4f45-9708-019B960494DF}">
-                <a14:hiddenLine xmlns:a14="http://schemas.microsoft.com/office/drawing/2010/main" xmlns="" w="9525">
+                <a14:hiddenLine xmlns="" xmlns:a14="http://schemas.microsoft.com/office/drawing/2010/main" w="9525">
                   <a:solidFill>
                     <a:srgbClr val="000000"/>
                   </a:solidFill>
@@ -1762,7 +1767,7 @@
             </a:ln>
             <a:extLst>
               <a:ext uri="{91240B29-F687-4f45-9708-019B960494DF}">
-                <a14:hiddenLine xmlns:a14="http://schemas.microsoft.com/office/drawing/2010/main" xmlns="" w="9525">
+                <a14:hiddenLine xmlns="" xmlns:a14="http://schemas.microsoft.com/office/drawing/2010/main" w="9525">
                   <a:solidFill>
                     <a:srgbClr val="000000"/>
                   </a:solidFill>
@@ -1852,7 +1857,7 @@
             </a:ln>
             <a:extLst>
               <a:ext uri="{91240B29-F687-4f45-9708-019B960494DF}">
-                <a14:hiddenLine xmlns:a14="http://schemas.microsoft.com/office/drawing/2010/main" xmlns="" w="9525">
+                <a14:hiddenLine xmlns="" xmlns:a14="http://schemas.microsoft.com/office/drawing/2010/main" w="9525">
                   <a:solidFill>
                     <a:srgbClr val="000000"/>
                   </a:solidFill>
@@ -1908,7 +1913,7 @@
             </a:ln>
             <a:extLst>
               <a:ext uri="{91240B29-F687-4f45-9708-019B960494DF}">
-                <a14:hiddenLine xmlns:a14="http://schemas.microsoft.com/office/drawing/2010/main" xmlns="" w="9525">
+                <a14:hiddenLine xmlns="" xmlns:a14="http://schemas.microsoft.com/office/drawing/2010/main" w="9525">
                   <a:solidFill>
                     <a:srgbClr val="000000"/>
                   </a:solidFill>
@@ -1998,7 +2003,7 @@
             </a:ln>
             <a:extLst>
               <a:ext uri="{91240B29-F687-4f45-9708-019B960494DF}">
-                <a14:hiddenLine xmlns:a14="http://schemas.microsoft.com/office/drawing/2010/main" xmlns="" w="9525">
+                <a14:hiddenLine xmlns="" xmlns:a14="http://schemas.microsoft.com/office/drawing/2010/main" w="9525">
                   <a:solidFill>
                     <a:srgbClr val="000000"/>
                   </a:solidFill>
@@ -2066,7 +2071,7 @@
             </a:ln>
             <a:extLst>
               <a:ext uri="{91240B29-F687-4f45-9708-019B960494DF}">
-                <a14:hiddenLine xmlns:a14="http://schemas.microsoft.com/office/drawing/2010/main" xmlns="" w="9525">
+                <a14:hiddenLine xmlns="" xmlns:a14="http://schemas.microsoft.com/office/drawing/2010/main" w="9525">
                   <a:solidFill>
                     <a:srgbClr val="000000"/>
                   </a:solidFill>
@@ -2156,7 +2161,7 @@
             </a:ln>
             <a:extLst>
               <a:ext uri="{91240B29-F687-4f45-9708-019B960494DF}">
-                <a14:hiddenLine xmlns:a14="http://schemas.microsoft.com/office/drawing/2010/main" xmlns="" w="9525">
+                <a14:hiddenLine xmlns="" xmlns:a14="http://schemas.microsoft.com/office/drawing/2010/main" w="9525">
                   <a:solidFill>
                     <a:srgbClr val="000000"/>
                   </a:solidFill>
@@ -2224,7 +2229,7 @@
             </a:ln>
             <a:extLst>
               <a:ext uri="{91240B29-F687-4f45-9708-019B960494DF}">
-                <a14:hiddenLine xmlns:a14="http://schemas.microsoft.com/office/drawing/2010/main" xmlns="" w="9525">
+                <a14:hiddenLine xmlns="" xmlns:a14="http://schemas.microsoft.com/office/drawing/2010/main" w="9525">
                   <a:solidFill>
                     <a:srgbClr val="000000"/>
                   </a:solidFill>
@@ -2314,7 +2319,7 @@
             </a:ln>
             <a:extLst>
               <a:ext uri="{91240B29-F687-4f45-9708-019B960494DF}">
-                <a14:hiddenLine xmlns:a14="http://schemas.microsoft.com/office/drawing/2010/main" xmlns="" w="9525">
+                <a14:hiddenLine xmlns="" xmlns:a14="http://schemas.microsoft.com/office/drawing/2010/main" w="9525">
                   <a:solidFill>
                     <a:srgbClr val="000000"/>
                   </a:solidFill>
@@ -2348,7 +2353,7 @@
             </a:ln>
             <a:extLst>
               <a:ext uri="{91240B29-F687-4f45-9708-019B960494DF}">
-                <a14:hiddenLine xmlns:a14="http://schemas.microsoft.com/office/drawing/2010/main" xmlns="" w="9525">
+                <a14:hiddenLine xmlns="" xmlns:a14="http://schemas.microsoft.com/office/drawing/2010/main" w="9525">
                   <a:solidFill>
                     <a:srgbClr val="000000"/>
                   </a:solidFill>
@@ -2438,7 +2443,7 @@
             </a:ln>
             <a:extLst>
               <a:ext uri="{91240B29-F687-4f45-9708-019B960494DF}">
-                <a14:hiddenLine xmlns:a14="http://schemas.microsoft.com/office/drawing/2010/main" xmlns="" w="9525">
+                <a14:hiddenLine xmlns="" xmlns:a14="http://schemas.microsoft.com/office/drawing/2010/main" w="9525">
                   <a:solidFill>
                     <a:srgbClr val="000000"/>
                   </a:solidFill>
@@ -2500,7 +2505,7 @@
             </a:ln>
             <a:extLst>
               <a:ext uri="{91240B29-F687-4f45-9708-019B960494DF}">
-                <a14:hiddenLine xmlns:a14="http://schemas.microsoft.com/office/drawing/2010/main" xmlns="" w="9525">
+                <a14:hiddenLine xmlns="" xmlns:a14="http://schemas.microsoft.com/office/drawing/2010/main" w="9525">
                   <a:solidFill>
                     <a:srgbClr val="000000"/>
                   </a:solidFill>
@@ -2562,7 +2567,7 @@
             </a:ln>
             <a:extLst>
               <a:ext uri="{91240B29-F687-4f45-9708-019B960494DF}">
-                <a14:hiddenLine xmlns:a14="http://schemas.microsoft.com/office/drawing/2010/main" xmlns="" w="9525">
+                <a14:hiddenLine xmlns="" xmlns:a14="http://schemas.microsoft.com/office/drawing/2010/main" w="9525">
                   <a:solidFill>
                     <a:srgbClr val="000000"/>
                   </a:solidFill>
@@ -2652,7 +2657,7 @@
             </a:ln>
             <a:extLst>
               <a:ext uri="{91240B29-F687-4f45-9708-019B960494DF}">
-                <a14:hiddenLine xmlns:a14="http://schemas.microsoft.com/office/drawing/2010/main" xmlns="" w="9525">
+                <a14:hiddenLine xmlns="" xmlns:a14="http://schemas.microsoft.com/office/drawing/2010/main" w="9525">
                   <a:solidFill>
                     <a:srgbClr val="000000"/>
                   </a:solidFill>
@@ -2720,7 +2725,7 @@
             </a:ln>
             <a:extLst>
               <a:ext uri="{91240B29-F687-4f45-9708-019B960494DF}">
-                <a14:hiddenLine xmlns:a14="http://schemas.microsoft.com/office/drawing/2010/main" xmlns="" w="9525">
+                <a14:hiddenLine xmlns="" xmlns:a14="http://schemas.microsoft.com/office/drawing/2010/main" w="9525">
                   <a:solidFill>
                     <a:srgbClr val="000000"/>
                   </a:solidFill>
@@ -2782,7 +2787,7 @@
             </a:ln>
             <a:extLst>
               <a:ext uri="{91240B29-F687-4f45-9708-019B960494DF}">
-                <a14:hiddenLine xmlns:a14="http://schemas.microsoft.com/office/drawing/2010/main" xmlns="" w="9525">
+                <a14:hiddenLine xmlns="" xmlns:a14="http://schemas.microsoft.com/office/drawing/2010/main" w="9525">
                   <a:solidFill>
                     <a:srgbClr val="000000"/>
                   </a:solidFill>
@@ -2872,7 +2877,7 @@
             </a:ln>
             <a:extLst>
               <a:ext uri="{91240B29-F687-4f45-9708-019B960494DF}">
-                <a14:hiddenLine xmlns:a14="http://schemas.microsoft.com/office/drawing/2010/main" xmlns="" w="9525">
+                <a14:hiddenLine xmlns="" xmlns:a14="http://schemas.microsoft.com/office/drawing/2010/main" w="9525">
                   <a:solidFill>
                     <a:srgbClr val="000000"/>
                   </a:solidFill>
@@ -2934,7 +2939,7 @@
             </a:ln>
             <a:extLst>
               <a:ext uri="{91240B29-F687-4f45-9708-019B960494DF}">
-                <a14:hiddenLine xmlns:a14="http://schemas.microsoft.com/office/drawing/2010/main" xmlns="" w="9525">
+                <a14:hiddenLine xmlns="" xmlns:a14="http://schemas.microsoft.com/office/drawing/2010/main" w="9525">
                   <a:solidFill>
                     <a:srgbClr val="000000"/>
                   </a:solidFill>
@@ -3024,7 +3029,7 @@
             </a:ln>
             <a:extLst>
               <a:ext uri="{91240B29-F687-4f45-9708-019B960494DF}">
-                <a14:hiddenLine xmlns:a14="http://schemas.microsoft.com/office/drawing/2010/main" xmlns="" w="9525">
+                <a14:hiddenLine xmlns="" xmlns:a14="http://schemas.microsoft.com/office/drawing/2010/main" w="9525">
                   <a:solidFill>
                     <a:srgbClr val="000000"/>
                   </a:solidFill>
@@ -3086,7 +3091,7 @@
             </a:ln>
             <a:extLst>
               <a:ext uri="{91240B29-F687-4f45-9708-019B960494DF}">
-                <a14:hiddenLine xmlns:a14="http://schemas.microsoft.com/office/drawing/2010/main" xmlns="" w="9525">
+                <a14:hiddenLine xmlns="" xmlns:a14="http://schemas.microsoft.com/office/drawing/2010/main" w="9525">
                   <a:solidFill>
                     <a:srgbClr val="000000"/>
                   </a:solidFill>
@@ -3176,7 +3181,7 @@
             </a:ln>
             <a:extLst>
               <a:ext uri="{91240B29-F687-4f45-9708-019B960494DF}">
-                <a14:hiddenLine xmlns:a14="http://schemas.microsoft.com/office/drawing/2010/main" xmlns="" w="9525">
+                <a14:hiddenLine xmlns="" xmlns:a14="http://schemas.microsoft.com/office/drawing/2010/main" w="9525">
                   <a:solidFill>
                     <a:srgbClr val="000000"/>
                   </a:solidFill>
@@ -3210,7 +3215,7 @@
             </a:ln>
             <a:extLst>
               <a:ext uri="{91240B29-F687-4f45-9708-019B960494DF}">
-                <a14:hiddenLine xmlns:a14="http://schemas.microsoft.com/office/drawing/2010/main" xmlns="" w="9525">
+                <a14:hiddenLine xmlns="" xmlns:a14="http://schemas.microsoft.com/office/drawing/2010/main" w="9525">
                   <a:solidFill>
                     <a:srgbClr val="000000"/>
                   </a:solidFill>
@@ -3275,7 +3280,7 @@
             </a:ln>
             <a:extLst>
               <a:ext uri="{91240B29-F687-4f45-9708-019B960494DF}">
-                <a14:hiddenLine xmlns:a14="http://schemas.microsoft.com/office/drawing/2010/main" xmlns="" w="9525">
+                <a14:hiddenLine xmlns="" xmlns:a14="http://schemas.microsoft.com/office/drawing/2010/main" w="9525">
                   <a:solidFill>
                     <a:srgbClr val="000000"/>
                   </a:solidFill>
@@ -3365,7 +3370,7 @@
             </a:ln>
             <a:extLst>
               <a:ext uri="{91240B29-F687-4f45-9708-019B960494DF}">
-                <a14:hiddenLine xmlns:a14="http://schemas.microsoft.com/office/drawing/2010/main" xmlns="" w="9525">
+                <a14:hiddenLine xmlns="" xmlns:a14="http://schemas.microsoft.com/office/drawing/2010/main" w="9525">
                   <a:solidFill>
                     <a:srgbClr val="000000"/>
                   </a:solidFill>
@@ -3427,7 +3432,7 @@
             </a:ln>
             <a:extLst>
               <a:ext uri="{91240B29-F687-4f45-9708-019B960494DF}">
-                <a14:hiddenLine xmlns:a14="http://schemas.microsoft.com/office/drawing/2010/main" xmlns="" w="9525">
+                <a14:hiddenLine xmlns="" xmlns:a14="http://schemas.microsoft.com/office/drawing/2010/main" w="9525">
                   <a:solidFill>
                     <a:srgbClr val="000000"/>
                   </a:solidFill>
@@ -3517,7 +3522,7 @@
             </a:ln>
             <a:extLst>
               <a:ext uri="{91240B29-F687-4f45-9708-019B960494DF}">
-                <a14:hiddenLine xmlns:a14="http://schemas.microsoft.com/office/drawing/2010/main" xmlns="" w="9525">
+                <a14:hiddenLine xmlns="" xmlns:a14="http://schemas.microsoft.com/office/drawing/2010/main" w="9525">
                   <a:solidFill>
                     <a:srgbClr val="000000"/>
                   </a:solidFill>
@@ -3607,7 +3612,7 @@
             </a:ln>
             <a:extLst>
               <a:ext uri="{91240B29-F687-4f45-9708-019B960494DF}">
-                <a14:hiddenLine xmlns:a14="http://schemas.microsoft.com/office/drawing/2010/main" xmlns="" w="9525">
+                <a14:hiddenLine xmlns="" xmlns:a14="http://schemas.microsoft.com/office/drawing/2010/main" w="9525">
                   <a:solidFill>
                     <a:srgbClr val="000000"/>
                   </a:solidFill>
@@ -3672,7 +3677,7 @@
             </a:ln>
             <a:extLst>
               <a:ext uri="{91240B29-F687-4f45-9708-019B960494DF}">
-                <a14:hiddenLine xmlns:a14="http://schemas.microsoft.com/office/drawing/2010/main" xmlns="" w="9525">
+                <a14:hiddenLine xmlns="" xmlns:a14="http://schemas.microsoft.com/office/drawing/2010/main" w="9525">
                   <a:solidFill>
                     <a:srgbClr val="000000"/>
                   </a:solidFill>
@@ -3734,7 +3739,7 @@
             </a:ln>
             <a:extLst>
               <a:ext uri="{91240B29-F687-4f45-9708-019B960494DF}">
-                <a14:hiddenLine xmlns:a14="http://schemas.microsoft.com/office/drawing/2010/main" xmlns="" w="9525">
+                <a14:hiddenLine xmlns="" xmlns:a14="http://schemas.microsoft.com/office/drawing/2010/main" w="9525">
                   <a:solidFill>
                     <a:srgbClr val="000000"/>
                   </a:solidFill>
@@ -3824,7 +3829,7 @@
             </a:ln>
             <a:extLst>
               <a:ext uri="{91240B29-F687-4f45-9708-019B960494DF}">
-                <a14:hiddenLine xmlns:a14="http://schemas.microsoft.com/office/drawing/2010/main" xmlns="" w="9525">
+                <a14:hiddenLine xmlns="" xmlns:a14="http://schemas.microsoft.com/office/drawing/2010/main" w="9525">
                   <a:solidFill>
                     <a:srgbClr val="000000"/>
                   </a:solidFill>
@@ -3914,7 +3919,7 @@
             </a:ln>
             <a:extLst>
               <a:ext uri="{91240B29-F687-4f45-9708-019B960494DF}">
-                <a14:hiddenLine xmlns:a14="http://schemas.microsoft.com/office/drawing/2010/main" xmlns="" w="9525">
+                <a14:hiddenLine xmlns="" xmlns:a14="http://schemas.microsoft.com/office/drawing/2010/main" w="9525">
                   <a:solidFill>
                     <a:srgbClr val="000000"/>
                   </a:solidFill>
@@ -3976,7 +3981,7 @@
             </a:ln>
             <a:extLst>
               <a:ext uri="{91240B29-F687-4f45-9708-019B960494DF}">
-                <a14:hiddenLine xmlns:a14="http://schemas.microsoft.com/office/drawing/2010/main" xmlns="" w="9525">
+                <a14:hiddenLine xmlns="" xmlns:a14="http://schemas.microsoft.com/office/drawing/2010/main" w="9525">
                   <a:solidFill>
                     <a:srgbClr val="000000"/>
                   </a:solidFill>
@@ -4096,7 +4101,7 @@
             </a:ln>
             <a:extLst>
               <a:ext uri="{91240B29-F687-4f45-9708-019B960494DF}">
-                <a14:hiddenLine xmlns:a14="http://schemas.microsoft.com/office/drawing/2010/main" xmlns="" w="9525">
+                <a14:hiddenLine xmlns="" xmlns:a14="http://schemas.microsoft.com/office/drawing/2010/main" w="9525">
                   <a:solidFill>
                     <a:srgbClr val="000000"/>
                   </a:solidFill>
@@ -4164,7 +4169,7 @@
             </a:ln>
             <a:extLst>
               <a:ext uri="{91240B29-F687-4f45-9708-019B960494DF}">
-                <a14:hiddenLine xmlns:a14="http://schemas.microsoft.com/office/drawing/2010/main" xmlns="" w="9525">
+                <a14:hiddenLine xmlns="" xmlns:a14="http://schemas.microsoft.com/office/drawing/2010/main" w="9525">
                   <a:solidFill>
                     <a:srgbClr val="000000"/>
                   </a:solidFill>
@@ -4254,7 +4259,7 @@
             </a:ln>
             <a:extLst>
               <a:ext uri="{91240B29-F687-4f45-9708-019B960494DF}">
-                <a14:hiddenLine xmlns:a14="http://schemas.microsoft.com/office/drawing/2010/main" xmlns="" w="9525">
+                <a14:hiddenLine xmlns="" xmlns:a14="http://schemas.microsoft.com/office/drawing/2010/main" w="9525">
                   <a:solidFill>
                     <a:srgbClr val="000000"/>
                   </a:solidFill>
@@ -4394,7 +4399,7 @@
           <a:p>
             <a:fld id="{48A87A34-81AB-432B-8DAE-1953F412C126}" type="datetimeFigureOut">
               <a:rPr lang="en-US" dirty="0"/>
-              <a:t>3/27/2025</a:t>
+              <a:t>3/28/2025</a:t>
             </a:fld>
             <a:endParaRPr lang="en-US" dirty="0"/>
           </a:p>
@@ -4656,7 +4661,7 @@
           <a:p>
             <a:fld id="{48A87A34-81AB-432B-8DAE-1953F412C126}" type="datetimeFigureOut">
               <a:rPr lang="en-US" dirty="0"/>
-              <a:t>3/27/2025</a:t>
+              <a:t>3/28/2025</a:t>
             </a:fld>
             <a:endParaRPr lang="en-US" dirty="0"/>
           </a:p>
@@ -4847,7 +4852,7 @@
           <a:p>
             <a:fld id="{48A87A34-81AB-432B-8DAE-1953F412C126}" type="datetimeFigureOut">
               <a:rPr lang="en-US" dirty="0"/>
-              <a:t>3/27/2025</a:t>
+              <a:t>3/28/2025</a:t>
             </a:fld>
             <a:endParaRPr lang="en-US" dirty="0"/>
           </a:p>
@@ -5105,7 +5110,7 @@
           <a:p>
             <a:fld id="{48A87A34-81AB-432B-8DAE-1953F412C126}" type="datetimeFigureOut">
               <a:rPr lang="en-US" dirty="0"/>
-              <a:t>3/27/2025</a:t>
+              <a:t>3/28/2025</a:t>
             </a:fld>
             <a:endParaRPr lang="en-US" dirty="0"/>
           </a:p>
@@ -5534,7 +5539,7 @@
           <a:p>
             <a:fld id="{48A87A34-81AB-432B-8DAE-1953F412C126}" type="datetimeFigureOut">
               <a:rPr lang="en-US" dirty="0"/>
-              <a:t>3/27/2025</a:t>
+              <a:t>3/28/2025</a:t>
             </a:fld>
             <a:endParaRPr lang="en-US" dirty="0"/>
           </a:p>
@@ -6075,7 +6080,7 @@
           <a:p>
             <a:fld id="{48A87A34-81AB-432B-8DAE-1953F412C126}" type="datetimeFigureOut">
               <a:rPr lang="en-US" dirty="0"/>
-              <a:t>3/27/2025</a:t>
+              <a:t>3/28/2025</a:t>
             </a:fld>
             <a:endParaRPr lang="en-US" dirty="0"/>
           </a:p>
@@ -6790,7 +6795,7 @@
           <a:p>
             <a:fld id="{48A87A34-81AB-432B-8DAE-1953F412C126}" type="datetimeFigureOut">
               <a:rPr lang="en-US" dirty="0"/>
-              <a:t>3/27/2025</a:t>
+              <a:t>3/28/2025</a:t>
             </a:fld>
             <a:endParaRPr lang="en-US" dirty="0"/>
           </a:p>
@@ -6955,7 +6960,7 @@
           <a:p>
             <a:fld id="{48A87A34-81AB-432B-8DAE-1953F412C126}" type="datetimeFigureOut">
               <a:rPr lang="en-US" dirty="0"/>
-              <a:t>3/27/2025</a:t>
+              <a:t>3/28/2025</a:t>
             </a:fld>
             <a:endParaRPr lang="en-US" dirty="0"/>
           </a:p>
@@ -7130,7 +7135,7 @@
           <a:p>
             <a:fld id="{48A87A34-81AB-432B-8DAE-1953F412C126}" type="datetimeFigureOut">
               <a:rPr lang="en-US" dirty="0"/>
-              <a:t>3/27/2025</a:t>
+              <a:t>3/28/2025</a:t>
             </a:fld>
             <a:endParaRPr lang="en-US" dirty="0"/>
           </a:p>
@@ -7295,7 +7300,7 @@
           <a:p>
             <a:fld id="{48A87A34-81AB-432B-8DAE-1953F412C126}" type="datetimeFigureOut">
               <a:rPr lang="en-US" dirty="0"/>
-              <a:t>3/27/2025</a:t>
+              <a:t>3/28/2025</a:t>
             </a:fld>
             <a:endParaRPr lang="en-US" dirty="0"/>
           </a:p>
@@ -7540,7 +7545,7 @@
           <a:p>
             <a:fld id="{48A87A34-81AB-432B-8DAE-1953F412C126}" type="datetimeFigureOut">
               <a:rPr lang="en-US" dirty="0"/>
-              <a:t>3/27/2025</a:t>
+              <a:t>3/28/2025</a:t>
             </a:fld>
             <a:endParaRPr lang="en-US" dirty="0"/>
           </a:p>
@@ -7767,7 +7772,7 @@
           <a:p>
             <a:fld id="{48A87A34-81AB-432B-8DAE-1953F412C126}" type="datetimeFigureOut">
               <a:rPr lang="en-US" dirty="0"/>
-              <a:t>3/27/2025</a:t>
+              <a:t>3/28/2025</a:t>
             </a:fld>
             <a:endParaRPr lang="en-US" dirty="0"/>
           </a:p>
@@ -8143,7 +8148,7 @@
           <a:p>
             <a:fld id="{48A87A34-81AB-432B-8DAE-1953F412C126}" type="datetimeFigureOut">
               <a:rPr lang="en-US" dirty="0"/>
-              <a:t>3/27/2025</a:t>
+              <a:t>3/28/2025</a:t>
             </a:fld>
             <a:endParaRPr lang="en-US" dirty="0"/>
           </a:p>
@@ -8256,7 +8261,7 @@
           <a:p>
             <a:fld id="{48A87A34-81AB-432B-8DAE-1953F412C126}" type="datetimeFigureOut">
               <a:rPr lang="en-US" dirty="0"/>
-              <a:t>3/27/2025</a:t>
+              <a:t>3/28/2025</a:t>
             </a:fld>
             <a:endParaRPr lang="en-US" dirty="0"/>
           </a:p>
@@ -8346,7 +8351,7 @@
           <a:p>
             <a:fld id="{48A87A34-81AB-432B-8DAE-1953F412C126}" type="datetimeFigureOut">
               <a:rPr lang="en-US" dirty="0"/>
-              <a:t>3/27/2025</a:t>
+              <a:t>3/28/2025</a:t>
             </a:fld>
             <a:endParaRPr lang="en-US" dirty="0"/>
           </a:p>
@@ -8590,7 +8595,7 @@
           <a:p>
             <a:fld id="{48A87A34-81AB-432B-8DAE-1953F412C126}" type="datetimeFigureOut">
               <a:rPr lang="en-US" dirty="0"/>
-              <a:t>3/27/2025</a:t>
+              <a:t>3/28/2025</a:t>
             </a:fld>
             <a:endParaRPr lang="en-US" dirty="0"/>
           </a:p>
@@ -8865,7 +8870,7 @@
           <a:p>
             <a:fld id="{48A87A34-81AB-432B-8DAE-1953F412C126}" type="datetimeFigureOut">
               <a:rPr lang="en-US" dirty="0"/>
-              <a:t>3/27/2025</a:t>
+              <a:t>3/28/2025</a:t>
             </a:fld>
             <a:endParaRPr lang="en-US" dirty="0"/>
           </a:p>
@@ -8976,7 +8981,7 @@
           <a:noFill/>
           <a:extLst>
             <a:ext uri="{909E8E84-426E-40dd-AFC4-6F175D3DCCD1}">
-              <a14:hiddenFill xmlns:a14="http://schemas.microsoft.com/office/drawing/2010/main" xmlns="">
+              <a14:hiddenFill xmlns="" xmlns:a14="http://schemas.microsoft.com/office/drawing/2010/main">
                 <a:solidFill>
                   <a:srgbClr val="FFFFFF"/>
                 </a:solidFill>
@@ -9050,7 +9055,7 @@
               </a:ln>
               <a:extLst>
                 <a:ext uri="{91240B29-F687-4f45-9708-019B960494DF}">
-                  <a14:hiddenLine xmlns:a14="http://schemas.microsoft.com/office/drawing/2010/main" xmlns="" w="9525">
+                  <a14:hiddenLine xmlns="" xmlns:a14="http://schemas.microsoft.com/office/drawing/2010/main" w="9525">
                     <a:solidFill>
                       <a:srgbClr val="000000"/>
                     </a:solidFill>
@@ -9140,7 +9145,7 @@
               </a:ln>
               <a:extLst>
                 <a:ext uri="{91240B29-F687-4f45-9708-019B960494DF}">
-                  <a14:hiddenLine xmlns:a14="http://schemas.microsoft.com/office/drawing/2010/main" xmlns="" w="9525">
+                  <a14:hiddenLine xmlns="" xmlns:a14="http://schemas.microsoft.com/office/drawing/2010/main" w="9525">
                     <a:solidFill>
                       <a:srgbClr val="000000"/>
                     </a:solidFill>
@@ -9230,7 +9235,7 @@
               </a:ln>
               <a:extLst>
                 <a:ext uri="{91240B29-F687-4f45-9708-019B960494DF}">
-                  <a14:hiddenLine xmlns:a14="http://schemas.microsoft.com/office/drawing/2010/main" xmlns="" w="9525">
+                  <a14:hiddenLine xmlns="" xmlns:a14="http://schemas.microsoft.com/office/drawing/2010/main" w="9525">
                     <a:solidFill>
                       <a:srgbClr val="000000"/>
                     </a:solidFill>
@@ -9292,7 +9297,7 @@
               </a:ln>
               <a:extLst>
                 <a:ext uri="{91240B29-F687-4f45-9708-019B960494DF}">
-                  <a14:hiddenLine xmlns:a14="http://schemas.microsoft.com/office/drawing/2010/main" xmlns="" w="9525">
+                  <a14:hiddenLine xmlns="" xmlns:a14="http://schemas.microsoft.com/office/drawing/2010/main" w="9525">
                     <a:solidFill>
                       <a:srgbClr val="000000"/>
                     </a:solidFill>
@@ -9382,7 +9387,7 @@
               </a:ln>
               <a:extLst>
                 <a:ext uri="{91240B29-F687-4f45-9708-019B960494DF}">
-                  <a14:hiddenLine xmlns:a14="http://schemas.microsoft.com/office/drawing/2010/main" xmlns="" w="9525">
+                  <a14:hiddenLine xmlns="" xmlns:a14="http://schemas.microsoft.com/office/drawing/2010/main" w="9525">
                     <a:solidFill>
                       <a:srgbClr val="000000"/>
                     </a:solidFill>
@@ -9444,7 +9449,7 @@
               </a:ln>
               <a:extLst>
                 <a:ext uri="{91240B29-F687-4f45-9708-019B960494DF}">
-                  <a14:hiddenLine xmlns:a14="http://schemas.microsoft.com/office/drawing/2010/main" xmlns="" w="9525">
+                  <a14:hiddenLine xmlns="" xmlns:a14="http://schemas.microsoft.com/office/drawing/2010/main" w="9525">
                     <a:solidFill>
                       <a:srgbClr val="000000"/>
                     </a:solidFill>
@@ -9506,7 +9511,7 @@
               </a:ln>
               <a:extLst>
                 <a:ext uri="{91240B29-F687-4f45-9708-019B960494DF}">
-                  <a14:hiddenLine xmlns:a14="http://schemas.microsoft.com/office/drawing/2010/main" xmlns="" w="9525">
+                  <a14:hiddenLine xmlns="" xmlns:a14="http://schemas.microsoft.com/office/drawing/2010/main" w="9525">
                     <a:solidFill>
                       <a:srgbClr val="000000"/>
                     </a:solidFill>
@@ -9596,7 +9601,7 @@
               </a:ln>
               <a:extLst>
                 <a:ext uri="{91240B29-F687-4f45-9708-019B960494DF}">
-                  <a14:hiddenLine xmlns:a14="http://schemas.microsoft.com/office/drawing/2010/main" xmlns="" w="9525">
+                  <a14:hiddenLine xmlns="" xmlns:a14="http://schemas.microsoft.com/office/drawing/2010/main" w="9525">
                     <a:solidFill>
                       <a:srgbClr val="000000"/>
                     </a:solidFill>
@@ -9686,7 +9691,7 @@
               </a:ln>
               <a:extLst>
                 <a:ext uri="{91240B29-F687-4f45-9708-019B960494DF}">
-                  <a14:hiddenLine xmlns:a14="http://schemas.microsoft.com/office/drawing/2010/main" xmlns="" w="9525">
+                  <a14:hiddenLine xmlns="" xmlns:a14="http://schemas.microsoft.com/office/drawing/2010/main" w="9525">
                     <a:solidFill>
                       <a:srgbClr val="000000"/>
                     </a:solidFill>
@@ -9748,7 +9753,7 @@
               </a:ln>
               <a:extLst>
                 <a:ext uri="{91240B29-F687-4f45-9708-019B960494DF}">
-                  <a14:hiddenLine xmlns:a14="http://schemas.microsoft.com/office/drawing/2010/main" xmlns="" w="9525">
+                  <a14:hiddenLine xmlns="" xmlns:a14="http://schemas.microsoft.com/office/drawing/2010/main" w="9525">
                     <a:solidFill>
                       <a:srgbClr val="000000"/>
                     </a:solidFill>
@@ -9858,7 +9863,7 @@
               </a:ln>
               <a:extLst>
                 <a:ext uri="{91240B29-F687-4f45-9708-019B960494DF}">
-                  <a14:hiddenLine xmlns:a14="http://schemas.microsoft.com/office/drawing/2010/main" xmlns="" w="9525">
+                  <a14:hiddenLine xmlns="" xmlns:a14="http://schemas.microsoft.com/office/drawing/2010/main" w="9525">
                     <a:solidFill>
                       <a:srgbClr val="000000"/>
                     </a:solidFill>
@@ -9942,7 +9947,7 @@
               </a:ln>
               <a:extLst>
                 <a:ext uri="{91240B29-F687-4f45-9708-019B960494DF}">
-                  <a14:hiddenLine xmlns:a14="http://schemas.microsoft.com/office/drawing/2010/main" xmlns="" w="9525">
+                  <a14:hiddenLine xmlns="" xmlns:a14="http://schemas.microsoft.com/office/drawing/2010/main" w="9525">
                     <a:solidFill>
                       <a:srgbClr val="000000"/>
                     </a:solidFill>
@@ -10004,7 +10009,7 @@
               </a:ln>
               <a:extLst>
                 <a:ext uri="{91240B29-F687-4f45-9708-019B960494DF}">
-                  <a14:hiddenLine xmlns:a14="http://schemas.microsoft.com/office/drawing/2010/main" xmlns="" w="9525">
+                  <a14:hiddenLine xmlns="" xmlns:a14="http://schemas.microsoft.com/office/drawing/2010/main" w="9525">
                     <a:solidFill>
                       <a:srgbClr val="000000"/>
                     </a:solidFill>
@@ -10066,7 +10071,7 @@
               </a:ln>
               <a:extLst>
                 <a:ext uri="{91240B29-F687-4f45-9708-019B960494DF}">
-                  <a14:hiddenLine xmlns:a14="http://schemas.microsoft.com/office/drawing/2010/main" xmlns="" w="9525">
+                  <a14:hiddenLine xmlns="" xmlns:a14="http://schemas.microsoft.com/office/drawing/2010/main" w="9525">
                     <a:solidFill>
                       <a:srgbClr val="000000"/>
                     </a:solidFill>
@@ -10156,7 +10161,7 @@
               </a:ln>
               <a:extLst>
                 <a:ext uri="{91240B29-F687-4f45-9708-019B960494DF}">
-                  <a14:hiddenLine xmlns:a14="http://schemas.microsoft.com/office/drawing/2010/main" xmlns="" w="9525">
+                  <a14:hiddenLine xmlns="" xmlns:a14="http://schemas.microsoft.com/office/drawing/2010/main" w="9525">
                     <a:solidFill>
                       <a:srgbClr val="000000"/>
                     </a:solidFill>
@@ -10190,7 +10195,7 @@
               </a:ln>
               <a:extLst>
                 <a:ext uri="{91240B29-F687-4f45-9708-019B960494DF}">
-                  <a14:hiddenLine xmlns:a14="http://schemas.microsoft.com/office/drawing/2010/main" xmlns="" w="9525">
+                  <a14:hiddenLine xmlns="" xmlns:a14="http://schemas.microsoft.com/office/drawing/2010/main" w="9525">
                     <a:solidFill>
                       <a:srgbClr val="000000"/>
                     </a:solidFill>
@@ -10255,7 +10260,7 @@
               </a:ln>
               <a:extLst>
                 <a:ext uri="{91240B29-F687-4f45-9708-019B960494DF}">
-                  <a14:hiddenLine xmlns:a14="http://schemas.microsoft.com/office/drawing/2010/main" xmlns="" w="9525">
+                  <a14:hiddenLine xmlns="" xmlns:a14="http://schemas.microsoft.com/office/drawing/2010/main" w="9525">
                     <a:solidFill>
                       <a:srgbClr val="000000"/>
                     </a:solidFill>
@@ -10345,7 +10350,7 @@
               </a:ln>
               <a:extLst>
                 <a:ext uri="{91240B29-F687-4f45-9708-019B960494DF}">
-                  <a14:hiddenLine xmlns:a14="http://schemas.microsoft.com/office/drawing/2010/main" xmlns="" w="9525">
+                  <a14:hiddenLine xmlns="" xmlns:a14="http://schemas.microsoft.com/office/drawing/2010/main" w="9525">
                     <a:solidFill>
                       <a:srgbClr val="000000"/>
                     </a:solidFill>
@@ -10407,7 +10412,7 @@
               </a:ln>
               <a:extLst>
                 <a:ext uri="{91240B29-F687-4f45-9708-019B960494DF}">
-                  <a14:hiddenLine xmlns:a14="http://schemas.microsoft.com/office/drawing/2010/main" xmlns="" w="9525">
+                  <a14:hiddenLine xmlns="" xmlns:a14="http://schemas.microsoft.com/office/drawing/2010/main" w="9525">
                     <a:solidFill>
                       <a:srgbClr val="000000"/>
                     </a:solidFill>
@@ -10497,7 +10502,7 @@
               </a:ln>
               <a:extLst>
                 <a:ext uri="{91240B29-F687-4f45-9708-019B960494DF}">
-                  <a14:hiddenLine xmlns:a14="http://schemas.microsoft.com/office/drawing/2010/main" xmlns="" w="9525">
+                  <a14:hiddenLine xmlns="" xmlns:a14="http://schemas.microsoft.com/office/drawing/2010/main" w="9525">
                     <a:solidFill>
                       <a:srgbClr val="000000"/>
                     </a:solidFill>
@@ -10562,7 +10567,7 @@
               </a:ln>
               <a:extLst>
                 <a:ext uri="{91240B29-F687-4f45-9708-019B960494DF}">
-                  <a14:hiddenLine xmlns:a14="http://schemas.microsoft.com/office/drawing/2010/main" xmlns="" w="9525">
+                  <a14:hiddenLine xmlns="" xmlns:a14="http://schemas.microsoft.com/office/drawing/2010/main" w="9525">
                     <a:solidFill>
                       <a:srgbClr val="000000"/>
                     </a:solidFill>
@@ -10624,7 +10629,7 @@
               </a:ln>
               <a:extLst>
                 <a:ext uri="{91240B29-F687-4f45-9708-019B960494DF}">
-                  <a14:hiddenLine xmlns:a14="http://schemas.microsoft.com/office/drawing/2010/main" xmlns="" w="9525">
+                  <a14:hiddenLine xmlns="" xmlns:a14="http://schemas.microsoft.com/office/drawing/2010/main" w="9525">
                     <a:solidFill>
                       <a:srgbClr val="000000"/>
                     </a:solidFill>
@@ -10714,7 +10719,7 @@
               </a:ln>
               <a:extLst>
                 <a:ext uri="{91240B29-F687-4f45-9708-019B960494DF}">
-                  <a14:hiddenLine xmlns:a14="http://schemas.microsoft.com/office/drawing/2010/main" xmlns="" w="9525">
+                  <a14:hiddenLine xmlns="" xmlns:a14="http://schemas.microsoft.com/office/drawing/2010/main" w="9525">
                     <a:solidFill>
                       <a:srgbClr val="000000"/>
                     </a:solidFill>
@@ -10804,7 +10809,7 @@
               </a:ln>
               <a:extLst>
                 <a:ext uri="{91240B29-F687-4f45-9708-019B960494DF}">
-                  <a14:hiddenLine xmlns:a14="http://schemas.microsoft.com/office/drawing/2010/main" xmlns="" w="9525">
+                  <a14:hiddenLine xmlns="" xmlns:a14="http://schemas.microsoft.com/office/drawing/2010/main" w="9525">
                     <a:solidFill>
                       <a:srgbClr val="000000"/>
                     </a:solidFill>
@@ -10869,7 +10874,7 @@
               </a:ln>
               <a:extLst>
                 <a:ext uri="{91240B29-F687-4f45-9708-019B960494DF}">
-                  <a14:hiddenLine xmlns:a14="http://schemas.microsoft.com/office/drawing/2010/main" xmlns="" w="9525">
+                  <a14:hiddenLine xmlns="" xmlns:a14="http://schemas.microsoft.com/office/drawing/2010/main" w="9525">
                     <a:solidFill>
                       <a:srgbClr val="000000"/>
                     </a:solidFill>
@@ -10989,7 +10994,7 @@
               </a:ln>
               <a:extLst>
                 <a:ext uri="{91240B29-F687-4f45-9708-019B960494DF}">
-                  <a14:hiddenLine xmlns:a14="http://schemas.microsoft.com/office/drawing/2010/main" xmlns="" w="9525">
+                  <a14:hiddenLine xmlns="" xmlns:a14="http://schemas.microsoft.com/office/drawing/2010/main" w="9525">
                     <a:solidFill>
                       <a:srgbClr val="000000"/>
                     </a:solidFill>
@@ -11087,7 +11092,7 @@
               </a:ln>
               <a:extLst>
                 <a:ext uri="{91240B29-F687-4f45-9708-019B960494DF}">
-                  <a14:hiddenLine xmlns:a14="http://schemas.microsoft.com/office/drawing/2010/main" xmlns="" w="9525">
+                  <a14:hiddenLine xmlns="" xmlns:a14="http://schemas.microsoft.com/office/drawing/2010/main" w="9525">
                     <a:solidFill>
                       <a:srgbClr val="000000"/>
                     </a:solidFill>
@@ -11202,7 +11207,7 @@
               </a:ln>
               <a:extLst>
                 <a:ext uri="{91240B29-F687-4f45-9708-019B960494DF}">
-                  <a14:hiddenLine xmlns:a14="http://schemas.microsoft.com/office/drawing/2010/main" xmlns="" w="9525">
+                  <a14:hiddenLine xmlns="" xmlns:a14="http://schemas.microsoft.com/office/drawing/2010/main" w="9525">
                     <a:solidFill>
                       <a:srgbClr val="000000"/>
                     </a:solidFill>
@@ -11292,7 +11297,7 @@
               </a:ln>
               <a:extLst>
                 <a:ext uri="{91240B29-F687-4f45-9708-019B960494DF}">
-                  <a14:hiddenLine xmlns:a14="http://schemas.microsoft.com/office/drawing/2010/main" xmlns="" w="9525">
+                  <a14:hiddenLine xmlns="" xmlns:a14="http://schemas.microsoft.com/office/drawing/2010/main" w="9525">
                     <a:solidFill>
                       <a:srgbClr val="000000"/>
                     </a:solidFill>
@@ -11357,7 +11362,7 @@
               </a:ln>
               <a:extLst>
                 <a:ext uri="{91240B29-F687-4f45-9708-019B960494DF}">
-                  <a14:hiddenLine xmlns:a14="http://schemas.microsoft.com/office/drawing/2010/main" xmlns="" w="9525">
+                  <a14:hiddenLine xmlns="" xmlns:a14="http://schemas.microsoft.com/office/drawing/2010/main" w="9525">
                     <a:solidFill>
                       <a:srgbClr val="000000"/>
                     </a:solidFill>
@@ -11447,7 +11452,7 @@
               </a:ln>
               <a:extLst>
                 <a:ext uri="{91240B29-F687-4f45-9708-019B960494DF}">
-                  <a14:hiddenLine xmlns:a14="http://schemas.microsoft.com/office/drawing/2010/main" xmlns="" w="9525">
+                  <a14:hiddenLine xmlns="" xmlns:a14="http://schemas.microsoft.com/office/drawing/2010/main" w="9525">
                     <a:solidFill>
                       <a:srgbClr val="000000"/>
                     </a:solidFill>
@@ -11515,7 +11520,7 @@
               </a:ln>
               <a:extLst>
                 <a:ext uri="{91240B29-F687-4f45-9708-019B960494DF}">
-                  <a14:hiddenLine xmlns:a14="http://schemas.microsoft.com/office/drawing/2010/main" xmlns="" w="9525">
+                  <a14:hiddenLine xmlns="" xmlns:a14="http://schemas.microsoft.com/office/drawing/2010/main" w="9525">
                     <a:solidFill>
                       <a:srgbClr val="000000"/>
                     </a:solidFill>
@@ -11605,7 +11610,7 @@
               </a:ln>
               <a:extLst>
                 <a:ext uri="{91240B29-F687-4f45-9708-019B960494DF}">
-                  <a14:hiddenLine xmlns:a14="http://schemas.microsoft.com/office/drawing/2010/main" xmlns="" w="9525">
+                  <a14:hiddenLine xmlns="" xmlns:a14="http://schemas.microsoft.com/office/drawing/2010/main" w="9525">
                     <a:solidFill>
                       <a:srgbClr val="000000"/>
                     </a:solidFill>
@@ -11673,7 +11678,7 @@
               </a:ln>
               <a:extLst>
                 <a:ext uri="{91240B29-F687-4f45-9708-019B960494DF}">
-                  <a14:hiddenLine xmlns:a14="http://schemas.microsoft.com/office/drawing/2010/main" xmlns="" w="9525">
+                  <a14:hiddenLine xmlns="" xmlns:a14="http://schemas.microsoft.com/office/drawing/2010/main" w="9525">
                     <a:solidFill>
                       <a:srgbClr val="000000"/>
                     </a:solidFill>
@@ -11763,7 +11768,7 @@
               </a:ln>
               <a:extLst>
                 <a:ext uri="{91240B29-F687-4f45-9708-019B960494DF}">
-                  <a14:hiddenLine xmlns:a14="http://schemas.microsoft.com/office/drawing/2010/main" xmlns="" w="9525">
+                  <a14:hiddenLine xmlns="" xmlns:a14="http://schemas.microsoft.com/office/drawing/2010/main" w="9525">
                     <a:solidFill>
                       <a:srgbClr val="000000"/>
                     </a:solidFill>
@@ -11797,7 +11802,7 @@
               </a:ln>
               <a:extLst>
                 <a:ext uri="{91240B29-F687-4f45-9708-019B960494DF}">
-                  <a14:hiddenLine xmlns:a14="http://schemas.microsoft.com/office/drawing/2010/main" xmlns="" w="9525">
+                  <a14:hiddenLine xmlns="" xmlns:a14="http://schemas.microsoft.com/office/drawing/2010/main" w="9525">
                     <a:solidFill>
                       <a:srgbClr val="000000"/>
                     </a:solidFill>
@@ -11938,7 +11943,7 @@
             <a:fld id="{48A87A34-81AB-432B-8DAE-1953F412C126}" type="datetimeFigureOut">
               <a:rPr lang="en-US" dirty="0"/>
               <a:pPr/>
-              <a:t>3/27/2025</a:t>
+              <a:t>3/28/2025</a:t>
             </a:fld>
             <a:endParaRPr lang="en-US" dirty="0"/>
           </a:p>

</xml_diff>